<commit_message>
Update all logos with the font "Helvetica"
</commit_message>
<xml_diff>
--- a/files/iswc2016-slide-formal.pptx
+++ b/files/iswc2016-slide-formal.pptx
@@ -201,7 +201,7 @@
           <a:p>
             <a:fld id="{AE4AC575-AC5C-A746-BE02-2EF7EA4BB4F7}" type="datetimeFigureOut">
               <a:rPr lang="en-US" smtClean="0"/>
-              <a:t>5/6/16</a:t>
+              <a:t>8/30/16</a:t>
             </a:fld>
             <a:endParaRPr lang="en-US"/>
           </a:p>
@@ -684,7 +684,7 @@
           <a:p>
             <a:fld id="{C0F9EF1C-D0A2-5244-B572-B94D592C689C}" type="datetime1">
               <a:rPr lang="en-US" smtClean="0"/>
-              <a:t>5/6/16</a:t>
+              <a:t>8/30/16</a:t>
             </a:fld>
             <a:endParaRPr lang="en-US"/>
           </a:p>
@@ -854,7 +854,7 @@
           <a:p>
             <a:fld id="{BC98ADD9-25BB-3746-8FC4-352E0147841D}" type="datetime1">
               <a:rPr lang="en-US" smtClean="0"/>
-              <a:t>5/6/16</a:t>
+              <a:t>8/30/16</a:t>
             </a:fld>
             <a:endParaRPr lang="en-US"/>
           </a:p>
@@ -1034,7 +1034,7 @@
           <a:p>
             <a:fld id="{E7BC0A6B-D513-6446-B76A-153525FEF765}" type="datetime1">
               <a:rPr lang="en-US" smtClean="0"/>
-              <a:t>5/6/16</a:t>
+              <a:t>8/30/16</a:t>
             </a:fld>
             <a:endParaRPr lang="en-US"/>
           </a:p>
@@ -1204,7 +1204,7 @@
           <a:p>
             <a:fld id="{20AD1FA1-66F5-FC42-82CA-0E9054FBA4C8}" type="datetime1">
               <a:rPr lang="en-US" smtClean="0"/>
-              <a:t>5/6/16</a:t>
+              <a:t>8/30/16</a:t>
             </a:fld>
             <a:endParaRPr lang="en-US"/>
           </a:p>
@@ -1448,7 +1448,7 @@
           <a:p>
             <a:fld id="{BCEAEB06-9E38-A24A-8EEE-3FF145BBE3AE}" type="datetime1">
               <a:rPr lang="en-US" smtClean="0"/>
-              <a:t>5/6/16</a:t>
+              <a:t>8/30/16</a:t>
             </a:fld>
             <a:endParaRPr lang="en-US"/>
           </a:p>
@@ -1680,7 +1680,7 @@
           <a:p>
             <a:fld id="{64868A99-DC4F-8C44-A1CB-F4D965EDBBFD}" type="datetime1">
               <a:rPr lang="en-US" smtClean="0"/>
-              <a:t>5/6/16</a:t>
+              <a:t>8/30/16</a:t>
             </a:fld>
             <a:endParaRPr lang="en-US"/>
           </a:p>
@@ -2047,7 +2047,7 @@
           <a:p>
             <a:fld id="{2ECB93BC-1205-B44D-BFB7-F6555B38B871}" type="datetime1">
               <a:rPr lang="en-US" smtClean="0"/>
-              <a:t>5/6/16</a:t>
+              <a:t>8/30/16</a:t>
             </a:fld>
             <a:endParaRPr lang="en-US"/>
           </a:p>
@@ -2165,7 +2165,7 @@
           <a:p>
             <a:fld id="{2FE3CEF1-5276-7043-8E22-023C01031606}" type="datetime1">
               <a:rPr lang="en-US" smtClean="0"/>
-              <a:t>5/6/16</a:t>
+              <a:t>8/30/16</a:t>
             </a:fld>
             <a:endParaRPr lang="en-US"/>
           </a:p>
@@ -2260,7 +2260,7 @@
           <a:p>
             <a:fld id="{4F8D836A-0EBF-F24A-95EF-F7D3329B9A30}" type="datetime1">
               <a:rPr lang="en-US" smtClean="0"/>
-              <a:t>5/6/16</a:t>
+              <a:t>8/30/16</a:t>
             </a:fld>
             <a:endParaRPr lang="en-US"/>
           </a:p>
@@ -2537,7 +2537,7 @@
           <a:p>
             <a:fld id="{A0524C8E-4C43-0542-AF80-389D5E204D18}" type="datetime1">
               <a:rPr lang="en-US" smtClean="0"/>
-              <a:t>5/6/16</a:t>
+              <a:t>8/30/16</a:t>
             </a:fld>
             <a:endParaRPr lang="en-US"/>
           </a:p>
@@ -2794,7 +2794,7 @@
           <a:p>
             <a:fld id="{1CAEC221-A751-574B-A0E6-06C291E3AECF}" type="datetime1">
               <a:rPr lang="en-US" smtClean="0"/>
-              <a:t>5/6/16</a:t>
+              <a:t>8/30/16</a:t>
             </a:fld>
             <a:endParaRPr lang="en-US"/>
           </a:p>
@@ -3007,7 +3007,7 @@
           <a:p>
             <a:fld id="{E23851E6-3CD1-8C41-831B-78F6F775DCC9}" type="datetime1">
               <a:rPr lang="en-US" smtClean="0"/>
-              <a:t>5/6/16</a:t>
+              <a:t>8/30/16</a:t>
             </a:fld>
             <a:endParaRPr lang="en-US"/>
           </a:p>
@@ -4536,9 +4536,9 @@
                 <a:p>
                   <a:r>
                     <a:rPr lang="en-US" sz="4286" b="0" dirty="0">
-                      <a:latin typeface="Helvetica Light" charset="0"/>
-                      <a:ea typeface="Helvetica Light" charset="0"/>
-                      <a:cs typeface="Helvetica Light" charset="0"/>
+                      <a:latin typeface="Helvetica" charset="0"/>
+                      <a:ea typeface="Helvetica" charset="0"/>
+                      <a:cs typeface="Helvetica" charset="0"/>
                     </a:rPr>
                     <a:t>2 0 1 6</a:t>
                   </a:r>
@@ -7845,9 +7845,9 @@
                 <a:p>
                   <a:r>
                     <a:rPr lang="en-US" sz="4286" b="0" dirty="0">
-                      <a:latin typeface="Helvetica Light" charset="0"/>
-                      <a:ea typeface="Helvetica Light" charset="0"/>
-                      <a:cs typeface="Helvetica Light" charset="0"/>
+                      <a:latin typeface="Helvetica" charset="0"/>
+                      <a:ea typeface="Helvetica" charset="0"/>
+                      <a:cs typeface="Helvetica" charset="0"/>
                     </a:rPr>
                     <a:t>2 0 1 6</a:t>
                   </a:r>
@@ -11095,9 +11095,9 @@
                 <a:p>
                   <a:r>
                     <a:rPr lang="en-US" sz="4286" b="0" dirty="0">
-                      <a:latin typeface="Helvetica Light" charset="0"/>
-                      <a:ea typeface="Helvetica Light" charset="0"/>
-                      <a:cs typeface="Helvetica Light" charset="0"/>
+                      <a:latin typeface="Helvetica" charset="0"/>
+                      <a:ea typeface="Helvetica" charset="0"/>
+                      <a:cs typeface="Helvetica" charset="0"/>
                     </a:rPr>
                     <a:t>2 0 1 6</a:t>
                   </a:r>
@@ -12371,9 +12371,9 @@
               <a:p>
                 <a:r>
                   <a:rPr lang="en-US" sz="4286" b="0" dirty="0">
-                    <a:latin typeface="Helvetica Light" charset="0"/>
-                    <a:ea typeface="Helvetica Light" charset="0"/>
-                    <a:cs typeface="Helvetica Light" charset="0"/>
+                    <a:latin typeface="Helvetica" charset="0"/>
+                    <a:ea typeface="Helvetica" charset="0"/>
+                    <a:cs typeface="Helvetica" charset="0"/>
                   </a:rPr>
                   <a:t>2 0 1 6</a:t>
                 </a:r>
@@ -13152,9 +13152,9 @@
                 <a:p>
                   <a:r>
                     <a:rPr lang="en-US" sz="4286" b="0" dirty="0">
-                      <a:latin typeface="Helvetica Light" charset="0"/>
-                      <a:ea typeface="Helvetica Light" charset="0"/>
-                      <a:cs typeface="Helvetica Light" charset="0"/>
+                      <a:latin typeface="Helvetica" charset="0"/>
+                      <a:ea typeface="Helvetica" charset="0"/>
+                      <a:cs typeface="Helvetica" charset="0"/>
                     </a:rPr>
                     <a:t>2 0 1 6</a:t>
                   </a:r>

</xml_diff>